<commit_message>
At last, TSS proof finished
</commit_message>
<xml_diff>
--- a/algorithm.pptx
+++ b/algorithm.pptx
@@ -201,7 +201,7 @@
           <a:p>
             <a:fld id="{D1CC56B5-FB3C-4909-B244-C81377A04AA3}" type="datetimeFigureOut">
               <a:rPr lang="en-US" smtClean="0"/>
-              <a:t>1/21/2017</a:t>
+              <a:t>1/23/2017</a:t>
             </a:fld>
             <a:endParaRPr lang="en-US"/>
           </a:p>
@@ -684,7 +684,7 @@
           <a:p>
             <a:fld id="{78B916F4-D157-4D3E-A7E3-3AB1D2EF3BCE}" type="datetimeFigureOut">
               <a:rPr lang="en-US" smtClean="0"/>
-              <a:t>1/21/2017</a:t>
+              <a:t>1/23/2017</a:t>
             </a:fld>
             <a:endParaRPr lang="en-US"/>
           </a:p>
@@ -854,7 +854,7 @@
           <a:p>
             <a:fld id="{78B916F4-D157-4D3E-A7E3-3AB1D2EF3BCE}" type="datetimeFigureOut">
               <a:rPr lang="en-US" smtClean="0"/>
-              <a:t>1/21/2017</a:t>
+              <a:t>1/23/2017</a:t>
             </a:fld>
             <a:endParaRPr lang="en-US"/>
           </a:p>
@@ -1034,7 +1034,7 @@
           <a:p>
             <a:fld id="{78B916F4-D157-4D3E-A7E3-3AB1D2EF3BCE}" type="datetimeFigureOut">
               <a:rPr lang="en-US" smtClean="0"/>
-              <a:t>1/21/2017</a:t>
+              <a:t>1/23/2017</a:t>
             </a:fld>
             <a:endParaRPr lang="en-US"/>
           </a:p>
@@ -1204,7 +1204,7 @@
           <a:p>
             <a:fld id="{78B916F4-D157-4D3E-A7E3-3AB1D2EF3BCE}" type="datetimeFigureOut">
               <a:rPr lang="en-US" smtClean="0"/>
-              <a:t>1/21/2017</a:t>
+              <a:t>1/23/2017</a:t>
             </a:fld>
             <a:endParaRPr lang="en-US"/>
           </a:p>
@@ -1450,7 +1450,7 @@
           <a:p>
             <a:fld id="{78B916F4-D157-4D3E-A7E3-3AB1D2EF3BCE}" type="datetimeFigureOut">
               <a:rPr lang="en-US" smtClean="0"/>
-              <a:t>1/21/2017</a:t>
+              <a:t>1/23/2017</a:t>
             </a:fld>
             <a:endParaRPr lang="en-US"/>
           </a:p>
@@ -1682,7 +1682,7 @@
           <a:p>
             <a:fld id="{78B916F4-D157-4D3E-A7E3-3AB1D2EF3BCE}" type="datetimeFigureOut">
               <a:rPr lang="en-US" smtClean="0"/>
-              <a:t>1/21/2017</a:t>
+              <a:t>1/23/2017</a:t>
             </a:fld>
             <a:endParaRPr lang="en-US"/>
           </a:p>
@@ -2049,7 +2049,7 @@
           <a:p>
             <a:fld id="{78B916F4-D157-4D3E-A7E3-3AB1D2EF3BCE}" type="datetimeFigureOut">
               <a:rPr lang="en-US" smtClean="0"/>
-              <a:t>1/21/2017</a:t>
+              <a:t>1/23/2017</a:t>
             </a:fld>
             <a:endParaRPr lang="en-US"/>
           </a:p>
@@ -2167,7 +2167,7 @@
           <a:p>
             <a:fld id="{78B916F4-D157-4D3E-A7E3-3AB1D2EF3BCE}" type="datetimeFigureOut">
               <a:rPr lang="en-US" smtClean="0"/>
-              <a:t>1/21/2017</a:t>
+              <a:t>1/23/2017</a:t>
             </a:fld>
             <a:endParaRPr lang="en-US"/>
           </a:p>
@@ -2262,7 +2262,7 @@
           <a:p>
             <a:fld id="{78B916F4-D157-4D3E-A7E3-3AB1D2EF3BCE}" type="datetimeFigureOut">
               <a:rPr lang="en-US" smtClean="0"/>
-              <a:t>1/21/2017</a:t>
+              <a:t>1/23/2017</a:t>
             </a:fld>
             <a:endParaRPr lang="en-US"/>
           </a:p>
@@ -2539,7 +2539,7 @@
           <a:p>
             <a:fld id="{78B916F4-D157-4D3E-A7E3-3AB1D2EF3BCE}" type="datetimeFigureOut">
               <a:rPr lang="en-US" smtClean="0"/>
-              <a:t>1/21/2017</a:t>
+              <a:t>1/23/2017</a:t>
             </a:fld>
             <a:endParaRPr lang="en-US"/>
           </a:p>
@@ -2792,7 +2792,7 @@
           <a:p>
             <a:fld id="{78B916F4-D157-4D3E-A7E3-3AB1D2EF3BCE}" type="datetimeFigureOut">
               <a:rPr lang="en-US" smtClean="0"/>
-              <a:t>1/21/2017</a:t>
+              <a:t>1/23/2017</a:t>
             </a:fld>
             <a:endParaRPr lang="en-US"/>
           </a:p>
@@ -3005,7 +3005,7 @@
           <a:p>
             <a:fld id="{78B916F4-D157-4D3E-A7E3-3AB1D2EF3BCE}" type="datetimeFigureOut">
               <a:rPr lang="en-US" smtClean="0"/>
-              <a:t>1/21/2017</a:t>
+              <a:t>1/23/2017</a:t>
             </a:fld>
             <a:endParaRPr lang="en-US"/>
           </a:p>
@@ -8182,8 +8182,33 @@
                 <a:latin typeface="Courier New" panose="02070309020205020404" pitchFamily="49" charset="0"/>
                 <a:cs typeface="Courier New" panose="02070309020205020404" pitchFamily="49" charset="0"/>
               </a:rPr>
-              <a:t> &lt; n-&gt;TS){</a:t>
-            </a:r>
+              <a:t> &lt; n-</a:t>
+            </a:r>
+            <a:r>
+              <a:rPr lang="en-US" dirty="0" smtClean="0">
+                <a:latin typeface="Courier New" panose="02070309020205020404" pitchFamily="49" charset="0"/>
+                <a:cs typeface="Courier New" panose="02070309020205020404" pitchFamily="49" charset="0"/>
+              </a:rPr>
+              <a:t>&gt;</a:t>
+            </a:r>
+            <a:r>
+              <a:rPr lang="en-US" dirty="0" err="1" smtClean="0">
+                <a:latin typeface="Courier New" panose="02070309020205020404" pitchFamily="49" charset="0"/>
+                <a:cs typeface="Courier New" panose="02070309020205020404" pitchFamily="49" charset="0"/>
+              </a:rPr>
+              <a:t>ts</a:t>
+            </a:r>
+            <a:r>
+              <a:rPr lang="en-US" dirty="0" smtClean="0">
+                <a:latin typeface="Courier New" panose="02070309020205020404" pitchFamily="49" charset="0"/>
+                <a:cs typeface="Courier New" panose="02070309020205020404" pitchFamily="49" charset="0"/>
+              </a:rPr>
+              <a:t>){</a:t>
+            </a:r>
+            <a:endParaRPr lang="en-US" dirty="0" smtClean="0">
+              <a:latin typeface="Courier New" panose="02070309020205020404" pitchFamily="49" charset="0"/>
+              <a:cs typeface="Courier New" panose="02070309020205020404" pitchFamily="49" charset="0"/>
+            </a:endParaRPr>
           </a:p>
           <a:p>
             <a:pPr marL="0" indent="0">
@@ -8256,11 +8281,11 @@
               <a:t>      youngest = </a:t>
             </a:r>
             <a:r>
-              <a:rPr lang="en-US" dirty="0" err="1" smtClean="0">
-                <a:latin typeface="Courier New" panose="02070309020205020404" pitchFamily="49" charset="0"/>
-                <a:cs typeface="Courier New" panose="02070309020205020404" pitchFamily="49" charset="0"/>
-              </a:rPr>
-              <a:t>ts</a:t>
+              <a:rPr lang="en-US" dirty="0">
+                <a:latin typeface="Courier New" panose="02070309020205020404" pitchFamily="49" charset="0"/>
+                <a:cs typeface="Courier New" panose="02070309020205020404" pitchFamily="49" charset="0"/>
+              </a:rPr>
+              <a:t>n</a:t>
             </a:r>
             <a:r>
               <a:rPr lang="en-US" dirty="0" smtClean="0">
@@ -8269,6 +8294,10 @@
               </a:rPr>
               <a:t>;</a:t>
             </a:r>
+            <a:endParaRPr lang="en-US" dirty="0" smtClean="0">
+              <a:latin typeface="Courier New" panose="02070309020205020404" pitchFamily="49" charset="0"/>
+              <a:cs typeface="Courier New" panose="02070309020205020404" pitchFamily="49" charset="0"/>
+            </a:endParaRPr>
           </a:p>
           <a:p>
             <a:pPr marL="0" indent="0">

</xml_diff>